<commit_message>
Wochenplan verbessert datum und text sowie "" hinzugefügt
</commit_message>
<xml_diff>
--- a/documents/Flussdiagramm.pptx
+++ b/documents/Flussdiagramm.pptx
@@ -6,6 +6,7 @@
   </p:sldMasterIdLst>
   <p:sldIdLst>
     <p:sldId id="256" r:id="rId2"/>
+    <p:sldId id="257" r:id="rId3"/>
   </p:sldIdLst>
   <p:sldSz cx="12192000" cy="6858000"/>
   <p:notesSz cx="6858000" cy="9144000"/>
@@ -104,6 +105,11 @@
       </a:defRPr>
     </a:lvl9pPr>
   </p:defaultTextStyle>
+  <p:extLst>
+    <p:ext uri="{EFAFB233-063F-42B5-8137-9DF3F51BA10A}">
+      <p15:sldGuideLst xmlns:p15="http://schemas.microsoft.com/office/powerpoint/2012/main"/>
+    </p:ext>
+  </p:extLst>
 </p:presentation>
 </file>
 
@@ -238,7 +244,7 @@
           <a:p>
             <a:fld id="{996139AF-0877-4894-8BE4-BB9FAD53005B}" type="datetimeFigureOut">
               <a:rPr lang="de-CH" smtClean="0"/>
-              <a:t>12.12.2016</a:t>
+              <a:t>15.12.2016</a:t>
             </a:fld>
             <a:endParaRPr lang="de-CH"/>
           </a:p>
@@ -408,7 +414,7 @@
           <a:p>
             <a:fld id="{996139AF-0877-4894-8BE4-BB9FAD53005B}" type="datetimeFigureOut">
               <a:rPr lang="de-CH" smtClean="0"/>
-              <a:t>12.12.2016</a:t>
+              <a:t>15.12.2016</a:t>
             </a:fld>
             <a:endParaRPr lang="de-CH"/>
           </a:p>
@@ -588,7 +594,7 @@
           <a:p>
             <a:fld id="{996139AF-0877-4894-8BE4-BB9FAD53005B}" type="datetimeFigureOut">
               <a:rPr lang="de-CH" smtClean="0"/>
-              <a:t>12.12.2016</a:t>
+              <a:t>15.12.2016</a:t>
             </a:fld>
             <a:endParaRPr lang="de-CH"/>
           </a:p>
@@ -758,7 +764,7 @@
           <a:p>
             <a:fld id="{996139AF-0877-4894-8BE4-BB9FAD53005B}" type="datetimeFigureOut">
               <a:rPr lang="de-CH" smtClean="0"/>
-              <a:t>12.12.2016</a:t>
+              <a:t>15.12.2016</a:t>
             </a:fld>
             <a:endParaRPr lang="de-CH"/>
           </a:p>
@@ -1004,7 +1010,7 @@
           <a:p>
             <a:fld id="{996139AF-0877-4894-8BE4-BB9FAD53005B}" type="datetimeFigureOut">
               <a:rPr lang="de-CH" smtClean="0"/>
-              <a:t>12.12.2016</a:t>
+              <a:t>15.12.2016</a:t>
             </a:fld>
             <a:endParaRPr lang="de-CH"/>
           </a:p>
@@ -1236,7 +1242,7 @@
           <a:p>
             <a:fld id="{996139AF-0877-4894-8BE4-BB9FAD53005B}" type="datetimeFigureOut">
               <a:rPr lang="de-CH" smtClean="0"/>
-              <a:t>12.12.2016</a:t>
+              <a:t>15.12.2016</a:t>
             </a:fld>
             <a:endParaRPr lang="de-CH"/>
           </a:p>
@@ -1603,7 +1609,7 @@
           <a:p>
             <a:fld id="{996139AF-0877-4894-8BE4-BB9FAD53005B}" type="datetimeFigureOut">
               <a:rPr lang="de-CH" smtClean="0"/>
-              <a:t>12.12.2016</a:t>
+              <a:t>15.12.2016</a:t>
             </a:fld>
             <a:endParaRPr lang="de-CH"/>
           </a:p>
@@ -1721,7 +1727,7 @@
           <a:p>
             <a:fld id="{996139AF-0877-4894-8BE4-BB9FAD53005B}" type="datetimeFigureOut">
               <a:rPr lang="de-CH" smtClean="0"/>
-              <a:t>12.12.2016</a:t>
+              <a:t>15.12.2016</a:t>
             </a:fld>
             <a:endParaRPr lang="de-CH"/>
           </a:p>
@@ -1816,7 +1822,7 @@
           <a:p>
             <a:fld id="{996139AF-0877-4894-8BE4-BB9FAD53005B}" type="datetimeFigureOut">
               <a:rPr lang="de-CH" smtClean="0"/>
-              <a:t>12.12.2016</a:t>
+              <a:t>15.12.2016</a:t>
             </a:fld>
             <a:endParaRPr lang="de-CH"/>
           </a:p>
@@ -2093,7 +2099,7 @@
           <a:p>
             <a:fld id="{996139AF-0877-4894-8BE4-BB9FAD53005B}" type="datetimeFigureOut">
               <a:rPr lang="de-CH" smtClean="0"/>
-              <a:t>12.12.2016</a:t>
+              <a:t>15.12.2016</a:t>
             </a:fld>
             <a:endParaRPr lang="de-CH"/>
           </a:p>
@@ -2346,7 +2352,7 @@
           <a:p>
             <a:fld id="{996139AF-0877-4894-8BE4-BB9FAD53005B}" type="datetimeFigureOut">
               <a:rPr lang="de-CH" smtClean="0"/>
-              <a:t>12.12.2016</a:t>
+              <a:t>15.12.2016</a:t>
             </a:fld>
             <a:endParaRPr lang="de-CH"/>
           </a:p>
@@ -2559,7 +2565,7 @@
           <a:p>
             <a:fld id="{996139AF-0877-4894-8BE4-BB9FAD53005B}" type="datetimeFigureOut">
               <a:rPr lang="de-CH" smtClean="0"/>
-              <a:t>12.12.2016</a:t>
+              <a:t>15.12.2016</a:t>
             </a:fld>
             <a:endParaRPr lang="de-CH"/>
           </a:p>
@@ -3505,6 +3511,791 @@
 </p:sld>
 </file>
 
+<file path=ppt/slides/slide2.xml><?xml version="1.0" encoding="utf-8"?>
+<p:sld xmlns:a="http://schemas.openxmlformats.org/drawingml/2006/main" xmlns:r="http://schemas.openxmlformats.org/officeDocument/2006/relationships" xmlns:p="http://schemas.openxmlformats.org/presentationml/2006/main">
+  <p:cSld>
+    <p:spTree>
+      <p:nvGrpSpPr>
+        <p:cNvPr id="1" name=""/>
+        <p:cNvGrpSpPr/>
+        <p:nvPr/>
+      </p:nvGrpSpPr>
+      <p:grpSpPr>
+        <a:xfrm>
+          <a:off x="0" y="0"/>
+          <a:ext cx="0" cy="0"/>
+          <a:chOff x="0" y="0"/>
+          <a:chExt cx="0" cy="0"/>
+        </a:xfrm>
+      </p:grpSpPr>
+      <p:sp>
+        <p:nvSpPr>
+          <p:cNvPr id="4" name="Flussdiagramm: Verbinder 3"/>
+          <p:cNvSpPr/>
+          <p:nvPr/>
+        </p:nvSpPr>
+        <p:spPr>
+          <a:xfrm>
+            <a:off x="1283515" y="2148627"/>
+            <a:ext cx="427838" cy="432033"/>
+          </a:xfrm>
+          <a:prstGeom prst="flowChartConnector">
+            <a:avLst/>
+          </a:prstGeom>
+        </p:spPr>
+        <p:style>
+          <a:lnRef idx="2">
+            <a:schemeClr val="accent1">
+              <a:shade val="50000"/>
+            </a:schemeClr>
+          </a:lnRef>
+          <a:fillRef idx="1">
+            <a:schemeClr val="accent1"/>
+          </a:fillRef>
+          <a:effectRef idx="0">
+            <a:schemeClr val="accent1"/>
+          </a:effectRef>
+          <a:fontRef idx="minor">
+            <a:schemeClr val="lt1"/>
+          </a:fontRef>
+        </p:style>
+        <p:txBody>
+          <a:bodyPr rtlCol="0" anchor="ctr"/>
+          <a:lstStyle/>
+          <a:p>
+            <a:pPr algn="ctr"/>
+            <a:endParaRPr lang="de-CH"/>
+          </a:p>
+        </p:txBody>
+      </p:sp>
+      <p:sp>
+        <p:nvSpPr>
+          <p:cNvPr id="5" name="Flussdiagramm: Zusammenführung 4"/>
+          <p:cNvSpPr/>
+          <p:nvPr/>
+        </p:nvSpPr>
+        <p:spPr>
+          <a:xfrm>
+            <a:off x="9274701" y="2171774"/>
+            <a:ext cx="393192" cy="385737"/>
+          </a:xfrm>
+          <a:prstGeom prst="flowChartSummingJunction">
+            <a:avLst/>
+          </a:prstGeom>
+        </p:spPr>
+        <p:style>
+          <a:lnRef idx="2">
+            <a:schemeClr val="accent1">
+              <a:shade val="50000"/>
+            </a:schemeClr>
+          </a:lnRef>
+          <a:fillRef idx="1">
+            <a:schemeClr val="accent1"/>
+          </a:fillRef>
+          <a:effectRef idx="0">
+            <a:schemeClr val="accent1"/>
+          </a:effectRef>
+          <a:fontRef idx="minor">
+            <a:schemeClr val="lt1"/>
+          </a:fontRef>
+        </p:style>
+        <p:txBody>
+          <a:bodyPr rtlCol="0" anchor="ctr"/>
+          <a:lstStyle/>
+          <a:p>
+            <a:pPr algn="ctr"/>
+            <a:endParaRPr lang="de-CH" sz="1100" dirty="0"/>
+          </a:p>
+        </p:txBody>
+      </p:sp>
+      <p:sp>
+        <p:nvSpPr>
+          <p:cNvPr id="6" name="Ellipse 5"/>
+          <p:cNvSpPr/>
+          <p:nvPr/>
+        </p:nvSpPr>
+        <p:spPr>
+          <a:xfrm>
+            <a:off x="2461499" y="1781608"/>
+            <a:ext cx="2315362" cy="1166070"/>
+          </a:xfrm>
+          <a:prstGeom prst="ellipse">
+            <a:avLst/>
+          </a:prstGeom>
+        </p:spPr>
+        <p:style>
+          <a:lnRef idx="2">
+            <a:schemeClr val="accent1">
+              <a:shade val="50000"/>
+            </a:schemeClr>
+          </a:lnRef>
+          <a:fillRef idx="1">
+            <a:schemeClr val="accent1"/>
+          </a:fillRef>
+          <a:effectRef idx="0">
+            <a:schemeClr val="accent1"/>
+          </a:effectRef>
+          <a:fontRef idx="minor">
+            <a:schemeClr val="lt1"/>
+          </a:fontRef>
+        </p:style>
+        <p:txBody>
+          <a:bodyPr rtlCol="0" anchor="ctr"/>
+          <a:lstStyle/>
+          <a:p>
+            <a:pPr algn="ctr"/>
+            <a:r>
+              <a:rPr lang="de-CH" dirty="0"/>
+              <a:t>Name und Message wird ausgelesen</a:t>
+            </a:r>
+          </a:p>
+        </p:txBody>
+      </p:sp>
+      <p:cxnSp>
+        <p:nvCxnSpPr>
+          <p:cNvPr id="8" name="Gerade Verbindung mit Pfeil 7"/>
+          <p:cNvCxnSpPr>
+            <a:stCxn id="4" idx="6"/>
+            <a:endCxn id="6" idx="2"/>
+          </p:cNvCxnSpPr>
+          <p:nvPr/>
+        </p:nvCxnSpPr>
+        <p:spPr>
+          <a:xfrm flipV="1">
+            <a:off x="1711353" y="2364643"/>
+            <a:ext cx="750146" cy="1"/>
+          </a:xfrm>
+          <a:prstGeom prst="straightConnector1">
+            <a:avLst/>
+          </a:prstGeom>
+          <a:ln>
+            <a:tailEnd type="triangle"/>
+          </a:ln>
+        </p:spPr>
+        <p:style>
+          <a:lnRef idx="1">
+            <a:schemeClr val="accent1"/>
+          </a:lnRef>
+          <a:fillRef idx="0">
+            <a:schemeClr val="accent1"/>
+          </a:fillRef>
+          <a:effectRef idx="0">
+            <a:schemeClr val="accent1"/>
+          </a:effectRef>
+          <a:fontRef idx="minor">
+            <a:schemeClr val="tx1"/>
+          </a:fontRef>
+        </p:style>
+      </p:cxnSp>
+      <p:sp>
+        <p:nvSpPr>
+          <p:cNvPr id="9" name="Raute 8"/>
+          <p:cNvSpPr/>
+          <p:nvPr/>
+        </p:nvSpPr>
+        <p:spPr>
+          <a:xfrm>
+            <a:off x="5654179" y="2016500"/>
+            <a:ext cx="822121" cy="696286"/>
+          </a:xfrm>
+          <a:prstGeom prst="diamond">
+            <a:avLst/>
+          </a:prstGeom>
+        </p:spPr>
+        <p:style>
+          <a:lnRef idx="2">
+            <a:schemeClr val="accent1">
+              <a:shade val="50000"/>
+            </a:schemeClr>
+          </a:lnRef>
+          <a:fillRef idx="1">
+            <a:schemeClr val="accent1"/>
+          </a:fillRef>
+          <a:effectRef idx="0">
+            <a:schemeClr val="accent1"/>
+          </a:effectRef>
+          <a:fontRef idx="minor">
+            <a:schemeClr val="lt1"/>
+          </a:fontRef>
+        </p:style>
+        <p:txBody>
+          <a:bodyPr rtlCol="0" anchor="ctr"/>
+          <a:lstStyle/>
+          <a:p>
+            <a:pPr algn="ctr"/>
+            <a:endParaRPr lang="de-CH"/>
+          </a:p>
+        </p:txBody>
+      </p:sp>
+      <p:cxnSp>
+        <p:nvCxnSpPr>
+          <p:cNvPr id="11" name="Gerade Verbindung mit Pfeil 10"/>
+          <p:cNvCxnSpPr>
+            <a:stCxn id="6" idx="6"/>
+            <a:endCxn id="9" idx="1"/>
+          </p:cNvCxnSpPr>
+          <p:nvPr/>
+        </p:nvCxnSpPr>
+        <p:spPr>
+          <a:xfrm>
+            <a:off x="4776861" y="2364643"/>
+            <a:ext cx="877318" cy="0"/>
+          </a:xfrm>
+          <a:prstGeom prst="straightConnector1">
+            <a:avLst/>
+          </a:prstGeom>
+          <a:ln>
+            <a:tailEnd type="triangle"/>
+          </a:ln>
+        </p:spPr>
+        <p:style>
+          <a:lnRef idx="1">
+            <a:schemeClr val="accent1"/>
+          </a:lnRef>
+          <a:fillRef idx="0">
+            <a:schemeClr val="accent1"/>
+          </a:fillRef>
+          <a:effectRef idx="0">
+            <a:schemeClr val="accent1"/>
+          </a:effectRef>
+          <a:fontRef idx="minor">
+            <a:schemeClr val="tx1"/>
+          </a:fontRef>
+        </p:style>
+      </p:cxnSp>
+      <p:sp>
+        <p:nvSpPr>
+          <p:cNvPr id="15" name="Rechteck 14"/>
+          <p:cNvSpPr/>
+          <p:nvPr/>
+        </p:nvSpPr>
+        <p:spPr>
+          <a:xfrm>
+            <a:off x="3260885" y="3530713"/>
+            <a:ext cx="1954635" cy="637564"/>
+          </a:xfrm>
+          <a:prstGeom prst="rect">
+            <a:avLst/>
+          </a:prstGeom>
+        </p:spPr>
+        <p:style>
+          <a:lnRef idx="2">
+            <a:schemeClr val="accent1">
+              <a:shade val="50000"/>
+            </a:schemeClr>
+          </a:lnRef>
+          <a:fillRef idx="1">
+            <a:schemeClr val="accent1"/>
+          </a:fillRef>
+          <a:effectRef idx="0">
+            <a:schemeClr val="accent1"/>
+          </a:effectRef>
+          <a:fontRef idx="minor">
+            <a:schemeClr val="lt1"/>
+          </a:fontRef>
+        </p:style>
+        <p:txBody>
+          <a:bodyPr rtlCol="0" anchor="ctr"/>
+          <a:lstStyle/>
+          <a:p>
+            <a:pPr algn="ctr"/>
+            <a:r>
+              <a:rPr lang="de-CH" dirty="0"/>
+              <a:t>Bitte geben sie einen Namen ein</a:t>
+            </a:r>
+          </a:p>
+        </p:txBody>
+      </p:sp>
+      <p:sp>
+        <p:nvSpPr>
+          <p:cNvPr id="16" name="Rechteck 15"/>
+          <p:cNvSpPr/>
+          <p:nvPr/>
+        </p:nvSpPr>
+        <p:spPr>
+          <a:xfrm>
+            <a:off x="5096312" y="308183"/>
+            <a:ext cx="1954635" cy="637564"/>
+          </a:xfrm>
+          <a:prstGeom prst="rect">
+            <a:avLst/>
+          </a:prstGeom>
+        </p:spPr>
+        <p:style>
+          <a:lnRef idx="2">
+            <a:schemeClr val="accent1">
+              <a:shade val="50000"/>
+            </a:schemeClr>
+          </a:lnRef>
+          <a:fillRef idx="1">
+            <a:schemeClr val="accent1"/>
+          </a:fillRef>
+          <a:effectRef idx="0">
+            <a:schemeClr val="accent1"/>
+          </a:effectRef>
+          <a:fontRef idx="minor">
+            <a:schemeClr val="lt1"/>
+          </a:fontRef>
+        </p:style>
+        <p:txBody>
+          <a:bodyPr rtlCol="0" anchor="ctr"/>
+          <a:lstStyle/>
+          <a:p>
+            <a:pPr algn="ctr"/>
+            <a:r>
+              <a:rPr lang="de-CH" dirty="0"/>
+              <a:t>Name und Message ausgeben</a:t>
+            </a:r>
+          </a:p>
+        </p:txBody>
+      </p:sp>
+      <p:cxnSp>
+        <p:nvCxnSpPr>
+          <p:cNvPr id="18" name="Gerade Verbindung mit Pfeil 17"/>
+          <p:cNvCxnSpPr>
+            <a:stCxn id="9" idx="0"/>
+            <a:endCxn id="16" idx="2"/>
+          </p:cNvCxnSpPr>
+          <p:nvPr/>
+        </p:nvCxnSpPr>
+        <p:spPr>
+          <a:xfrm flipV="1">
+            <a:off x="6065240" y="945747"/>
+            <a:ext cx="8390" cy="1070753"/>
+          </a:xfrm>
+          <a:prstGeom prst="straightConnector1">
+            <a:avLst/>
+          </a:prstGeom>
+          <a:ln>
+            <a:tailEnd type="triangle"/>
+          </a:ln>
+        </p:spPr>
+        <p:style>
+          <a:lnRef idx="1">
+            <a:schemeClr val="accent1"/>
+          </a:lnRef>
+          <a:fillRef idx="0">
+            <a:schemeClr val="accent1"/>
+          </a:fillRef>
+          <a:effectRef idx="0">
+            <a:schemeClr val="accent1"/>
+          </a:effectRef>
+          <a:fontRef idx="minor">
+            <a:schemeClr val="tx1"/>
+          </a:fontRef>
+        </p:style>
+      </p:cxnSp>
+      <p:cxnSp>
+        <p:nvCxnSpPr>
+          <p:cNvPr id="20" name="Gerade Verbindung mit Pfeil 19"/>
+          <p:cNvCxnSpPr>
+            <a:stCxn id="9" idx="2"/>
+            <a:endCxn id="15" idx="3"/>
+          </p:cNvCxnSpPr>
+          <p:nvPr/>
+        </p:nvCxnSpPr>
+        <p:spPr>
+          <a:xfrm flipH="1">
+            <a:off x="5215520" y="2712786"/>
+            <a:ext cx="849720" cy="1136709"/>
+          </a:xfrm>
+          <a:prstGeom prst="straightConnector1">
+            <a:avLst/>
+          </a:prstGeom>
+          <a:ln>
+            <a:tailEnd type="triangle"/>
+          </a:ln>
+        </p:spPr>
+        <p:style>
+          <a:lnRef idx="1">
+            <a:schemeClr val="accent1"/>
+          </a:lnRef>
+          <a:fillRef idx="0">
+            <a:schemeClr val="accent1"/>
+          </a:fillRef>
+          <a:effectRef idx="0">
+            <a:schemeClr val="accent1"/>
+          </a:effectRef>
+          <a:fontRef idx="minor">
+            <a:schemeClr val="tx1"/>
+          </a:fontRef>
+        </p:style>
+      </p:cxnSp>
+      <p:sp>
+        <p:nvSpPr>
+          <p:cNvPr id="21" name="Textfeld 20"/>
+          <p:cNvSpPr txBox="1"/>
+          <p:nvPr/>
+        </p:nvSpPr>
+        <p:spPr>
+          <a:xfrm>
+            <a:off x="6333688" y="1270803"/>
+            <a:ext cx="1434518" cy="646331"/>
+          </a:xfrm>
+          <a:prstGeom prst="rect">
+            <a:avLst/>
+          </a:prstGeom>
+          <a:noFill/>
+        </p:spPr>
+        <p:txBody>
+          <a:bodyPr wrap="square" rtlCol="0">
+            <a:spAutoFit/>
+          </a:bodyPr>
+          <a:lstStyle/>
+          <a:p>
+            <a:r>
+              <a:rPr lang="de-CH" dirty="0"/>
+              <a:t>Beides Vorhanden</a:t>
+            </a:r>
+          </a:p>
+        </p:txBody>
+      </p:sp>
+      <p:sp>
+        <p:nvSpPr>
+          <p:cNvPr id="22" name="Textfeld 21"/>
+          <p:cNvSpPr txBox="1"/>
+          <p:nvPr/>
+        </p:nvSpPr>
+        <p:spPr>
+          <a:xfrm>
+            <a:off x="4561178" y="2681138"/>
+            <a:ext cx="1308683" cy="646331"/>
+          </a:xfrm>
+          <a:prstGeom prst="rect">
+            <a:avLst/>
+          </a:prstGeom>
+          <a:noFill/>
+        </p:spPr>
+        <p:txBody>
+          <a:bodyPr wrap="square" rtlCol="0">
+            <a:spAutoFit/>
+          </a:bodyPr>
+          <a:lstStyle/>
+          <a:p>
+            <a:r>
+              <a:rPr lang="de-CH" dirty="0"/>
+              <a:t>Name nicht Vorhanden</a:t>
+            </a:r>
+          </a:p>
+        </p:txBody>
+      </p:sp>
+      <p:cxnSp>
+        <p:nvCxnSpPr>
+          <p:cNvPr id="24" name="Gewinkelter Verbinder 23"/>
+          <p:cNvCxnSpPr>
+            <a:stCxn id="16" idx="3"/>
+            <a:endCxn id="5" idx="0"/>
+          </p:cNvCxnSpPr>
+          <p:nvPr/>
+        </p:nvCxnSpPr>
+        <p:spPr>
+          <a:xfrm>
+            <a:off x="7050947" y="626965"/>
+            <a:ext cx="2420350" cy="1544809"/>
+          </a:xfrm>
+          <a:prstGeom prst="bentConnector2">
+            <a:avLst/>
+          </a:prstGeom>
+          <a:ln>
+            <a:tailEnd type="triangle"/>
+          </a:ln>
+        </p:spPr>
+        <p:style>
+          <a:lnRef idx="1">
+            <a:schemeClr val="accent1"/>
+          </a:lnRef>
+          <a:fillRef idx="0">
+            <a:schemeClr val="accent1"/>
+          </a:fillRef>
+          <a:effectRef idx="0">
+            <a:schemeClr val="accent1"/>
+          </a:effectRef>
+          <a:fontRef idx="minor">
+            <a:schemeClr val="tx1"/>
+          </a:fontRef>
+        </p:style>
+      </p:cxnSp>
+      <p:cxnSp>
+        <p:nvCxnSpPr>
+          <p:cNvPr id="44" name="Gerade Verbindung mit Pfeil 43"/>
+          <p:cNvCxnSpPr>
+            <a:stCxn id="15" idx="1"/>
+            <a:endCxn id="4" idx="4"/>
+          </p:cNvCxnSpPr>
+          <p:nvPr/>
+        </p:nvCxnSpPr>
+        <p:spPr>
+          <a:xfrm flipH="1" flipV="1">
+            <a:off x="1497434" y="2580660"/>
+            <a:ext cx="1763451" cy="1268835"/>
+          </a:xfrm>
+          <a:prstGeom prst="straightConnector1">
+            <a:avLst/>
+          </a:prstGeom>
+          <a:ln>
+            <a:tailEnd type="triangle"/>
+          </a:ln>
+        </p:spPr>
+        <p:style>
+          <a:lnRef idx="1">
+            <a:schemeClr val="accent1"/>
+          </a:lnRef>
+          <a:fillRef idx="0">
+            <a:schemeClr val="accent1"/>
+          </a:fillRef>
+          <a:effectRef idx="0">
+            <a:schemeClr val="accent1"/>
+          </a:effectRef>
+          <a:fontRef idx="minor">
+            <a:schemeClr val="tx1"/>
+          </a:fontRef>
+        </p:style>
+      </p:cxnSp>
+      <p:sp>
+        <p:nvSpPr>
+          <p:cNvPr id="46" name="Rechteck 45"/>
+          <p:cNvSpPr/>
+          <p:nvPr/>
+        </p:nvSpPr>
+        <p:spPr>
+          <a:xfrm>
+            <a:off x="7866075" y="5586255"/>
+            <a:ext cx="2334937" cy="873268"/>
+          </a:xfrm>
+          <a:prstGeom prst="rect">
+            <a:avLst/>
+          </a:prstGeom>
+        </p:spPr>
+        <p:style>
+          <a:lnRef idx="2">
+            <a:schemeClr val="accent1">
+              <a:shade val="50000"/>
+            </a:schemeClr>
+          </a:lnRef>
+          <a:fillRef idx="1">
+            <a:schemeClr val="accent1"/>
+          </a:fillRef>
+          <a:effectRef idx="0">
+            <a:schemeClr val="accent1"/>
+          </a:effectRef>
+          <a:fontRef idx="minor">
+            <a:schemeClr val="lt1"/>
+          </a:fontRef>
+        </p:style>
+        <p:txBody>
+          <a:bodyPr rtlCol="0" anchor="ctr"/>
+          <a:lstStyle/>
+          <a:p>
+            <a:pPr algn="ctr"/>
+            <a:r>
+              <a:rPr lang="de-CH" dirty="0"/>
+              <a:t>Bitte geben sie einen Namen und eine  Message ein.</a:t>
+            </a:r>
+          </a:p>
+        </p:txBody>
+      </p:sp>
+      <p:cxnSp>
+        <p:nvCxnSpPr>
+          <p:cNvPr id="50" name="Gerade Verbindung mit Pfeil 49"/>
+          <p:cNvCxnSpPr>
+            <a:stCxn id="9" idx="3"/>
+            <a:endCxn id="46" idx="0"/>
+          </p:cNvCxnSpPr>
+          <p:nvPr/>
+        </p:nvCxnSpPr>
+        <p:spPr>
+          <a:xfrm>
+            <a:off x="6476300" y="2364643"/>
+            <a:ext cx="2557244" cy="3221612"/>
+          </a:xfrm>
+          <a:prstGeom prst="straightConnector1">
+            <a:avLst/>
+          </a:prstGeom>
+          <a:ln>
+            <a:tailEnd type="triangle"/>
+          </a:ln>
+        </p:spPr>
+        <p:style>
+          <a:lnRef idx="1">
+            <a:schemeClr val="accent1"/>
+          </a:lnRef>
+          <a:fillRef idx="0">
+            <a:schemeClr val="accent1"/>
+          </a:fillRef>
+          <a:effectRef idx="0">
+            <a:schemeClr val="accent1"/>
+          </a:effectRef>
+          <a:fontRef idx="minor">
+            <a:schemeClr val="tx1"/>
+          </a:fontRef>
+        </p:style>
+      </p:cxnSp>
+      <p:cxnSp>
+        <p:nvCxnSpPr>
+          <p:cNvPr id="54" name="Gewinkelter Verbinder 53"/>
+          <p:cNvCxnSpPr>
+            <a:stCxn id="46" idx="1"/>
+            <a:endCxn id="4" idx="2"/>
+          </p:cNvCxnSpPr>
+          <p:nvPr/>
+        </p:nvCxnSpPr>
+        <p:spPr>
+          <a:xfrm rot="10800000">
+            <a:off x="1283515" y="2364645"/>
+            <a:ext cx="6582560" cy="3658245"/>
+          </a:xfrm>
+          <a:prstGeom prst="bentConnector3">
+            <a:avLst>
+              <a:gd name="adj1" fmla="val 103473"/>
+            </a:avLst>
+          </a:prstGeom>
+          <a:ln>
+            <a:tailEnd type="triangle"/>
+          </a:ln>
+        </p:spPr>
+        <p:style>
+          <a:lnRef idx="1">
+            <a:schemeClr val="accent1"/>
+          </a:lnRef>
+          <a:fillRef idx="0">
+            <a:schemeClr val="accent1"/>
+          </a:fillRef>
+          <a:effectRef idx="0">
+            <a:schemeClr val="accent1"/>
+          </a:effectRef>
+          <a:fontRef idx="minor">
+            <a:schemeClr val="tx1"/>
+          </a:fontRef>
+        </p:style>
+      </p:cxnSp>
+      <p:sp>
+        <p:nvSpPr>
+          <p:cNvPr id="59" name="Rechteck 58"/>
+          <p:cNvSpPr/>
+          <p:nvPr/>
+        </p:nvSpPr>
+        <p:spPr>
+          <a:xfrm>
+            <a:off x="5498982" y="4441779"/>
+            <a:ext cx="1954635" cy="637564"/>
+          </a:xfrm>
+          <a:prstGeom prst="rect">
+            <a:avLst/>
+          </a:prstGeom>
+        </p:spPr>
+        <p:style>
+          <a:lnRef idx="2">
+            <a:schemeClr val="accent1">
+              <a:shade val="50000"/>
+            </a:schemeClr>
+          </a:lnRef>
+          <a:fillRef idx="1">
+            <a:schemeClr val="accent1"/>
+          </a:fillRef>
+          <a:effectRef idx="0">
+            <a:schemeClr val="accent1"/>
+          </a:effectRef>
+          <a:fontRef idx="minor">
+            <a:schemeClr val="lt1"/>
+          </a:fontRef>
+        </p:style>
+        <p:txBody>
+          <a:bodyPr rtlCol="0" anchor="ctr"/>
+          <a:lstStyle/>
+          <a:p>
+            <a:pPr algn="ctr"/>
+            <a:r>
+              <a:rPr lang="de-CH" dirty="0"/>
+              <a:t>Bitte geben sie eine Message ein.</a:t>
+            </a:r>
+          </a:p>
+        </p:txBody>
+      </p:sp>
+      <p:cxnSp>
+        <p:nvCxnSpPr>
+          <p:cNvPr id="61" name="Gerade Verbindung mit Pfeil 60"/>
+          <p:cNvCxnSpPr>
+            <a:stCxn id="9" idx="3"/>
+            <a:endCxn id="59" idx="0"/>
+          </p:cNvCxnSpPr>
+          <p:nvPr/>
+        </p:nvCxnSpPr>
+        <p:spPr>
+          <a:xfrm>
+            <a:off x="6476300" y="2364643"/>
+            <a:ext cx="0" cy="2077136"/>
+          </a:xfrm>
+          <a:prstGeom prst="straightConnector1">
+            <a:avLst/>
+          </a:prstGeom>
+          <a:ln>
+            <a:tailEnd type="triangle"/>
+          </a:ln>
+        </p:spPr>
+        <p:style>
+          <a:lnRef idx="1">
+            <a:schemeClr val="accent1"/>
+          </a:lnRef>
+          <a:fillRef idx="0">
+            <a:schemeClr val="accent1"/>
+          </a:fillRef>
+          <a:effectRef idx="0">
+            <a:schemeClr val="accent1"/>
+          </a:effectRef>
+          <a:fontRef idx="minor">
+            <a:schemeClr val="tx1"/>
+          </a:fontRef>
+        </p:style>
+      </p:cxnSp>
+      <p:cxnSp>
+        <p:nvCxnSpPr>
+          <p:cNvPr id="68" name="Gewinkelter Verbinder 67"/>
+          <p:cNvCxnSpPr>
+            <a:stCxn id="59" idx="1"/>
+            <a:endCxn id="4" idx="4"/>
+          </p:cNvCxnSpPr>
+          <p:nvPr/>
+        </p:nvCxnSpPr>
+        <p:spPr>
+          <a:xfrm rot="10800000">
+            <a:off x="1497434" y="2580661"/>
+            <a:ext cx="4001548" cy="2179901"/>
+          </a:xfrm>
+          <a:prstGeom prst="bentConnector2">
+            <a:avLst/>
+          </a:prstGeom>
+          <a:ln>
+            <a:tailEnd type="triangle"/>
+          </a:ln>
+        </p:spPr>
+        <p:style>
+          <a:lnRef idx="1">
+            <a:schemeClr val="accent1"/>
+          </a:lnRef>
+          <a:fillRef idx="0">
+            <a:schemeClr val="accent1"/>
+          </a:fillRef>
+          <a:effectRef idx="0">
+            <a:schemeClr val="accent1"/>
+          </a:effectRef>
+          <a:fontRef idx="minor">
+            <a:schemeClr val="tx1"/>
+          </a:fontRef>
+        </p:style>
+      </p:cxnSp>
+    </p:spTree>
+    <p:extLst>
+      <p:ext uri="{BB962C8B-B14F-4D97-AF65-F5344CB8AC3E}">
+        <p14:creationId xmlns:p14="http://schemas.microsoft.com/office/powerpoint/2010/main" val="2232329221"/>
+      </p:ext>
+    </p:extLst>
+  </p:cSld>
+  <p:clrMapOvr>
+    <a:masterClrMapping/>
+  </p:clrMapOvr>
+</p:sld>
+</file>
+
 <file path=ppt/theme/theme1.xml><?xml version="1.0" encoding="utf-8"?>
 <a:theme xmlns:a="http://schemas.openxmlformats.org/drawingml/2006/main" name="Office">
   <a:themeElements>

</xml_diff>